<commit_message>
Updated responsiveness for text and images for Outlook and Gmail, updated alt text, added section comments
</commit_message>
<xml_diff>
--- a/Periodic-Welcome-Light/images/images-edits.pptx
+++ b/Periodic-Welcome-Light/images/images-edits.pptx
@@ -6,6 +6,8 @@
   </p:sldMasterIdLst>
   <p:sldIdLst>
     <p:sldId id="256" r:id="rId2"/>
+    <p:sldId id="257" r:id="rId3"/>
+    <p:sldId id="258" r:id="rId4"/>
   </p:sldIdLst>
   <p:sldSz cx="12192000" cy="6858000"/>
   <p:notesSz cx="6858000" cy="9144000"/>
@@ -104,6 +106,11 @@
       </a:defRPr>
     </a:lvl9pPr>
   </p:defaultTextStyle>
+  <p:extLst>
+    <p:ext uri="{EFAFB233-063F-42B5-8137-9DF3F51BA10A}">
+      <p15:sldGuideLst xmlns:p15="http://schemas.microsoft.com/office/powerpoint/2012/main"/>
+    </p:ext>
+  </p:extLst>
 </p:presentation>
 </file>
 
@@ -256,7 +263,7 @@
           <a:p>
             <a:fld id="{D9479DD7-8618-4892-AD77-F3908D95C210}" type="datetimeFigureOut">
               <a:rPr lang="en-CA" smtClean="0"/>
-              <a:t>2023-10-26</a:t>
+              <a:t>2023-10-30</a:t>
             </a:fld>
             <a:endParaRPr lang="en-CA"/>
           </a:p>
@@ -456,7 +463,7 @@
           <a:p>
             <a:fld id="{D9479DD7-8618-4892-AD77-F3908D95C210}" type="datetimeFigureOut">
               <a:rPr lang="en-CA" smtClean="0"/>
-              <a:t>2023-10-26</a:t>
+              <a:t>2023-10-30</a:t>
             </a:fld>
             <a:endParaRPr lang="en-CA"/>
           </a:p>
@@ -666,7 +673,7 @@
           <a:p>
             <a:fld id="{D9479DD7-8618-4892-AD77-F3908D95C210}" type="datetimeFigureOut">
               <a:rPr lang="en-CA" smtClean="0"/>
-              <a:t>2023-10-26</a:t>
+              <a:t>2023-10-30</a:t>
             </a:fld>
             <a:endParaRPr lang="en-CA"/>
           </a:p>
@@ -866,7 +873,7 @@
           <a:p>
             <a:fld id="{D9479DD7-8618-4892-AD77-F3908D95C210}" type="datetimeFigureOut">
               <a:rPr lang="en-CA" smtClean="0"/>
-              <a:t>2023-10-26</a:t>
+              <a:t>2023-10-30</a:t>
             </a:fld>
             <a:endParaRPr lang="en-CA"/>
           </a:p>
@@ -1142,7 +1149,7 @@
           <a:p>
             <a:fld id="{D9479DD7-8618-4892-AD77-F3908D95C210}" type="datetimeFigureOut">
               <a:rPr lang="en-CA" smtClean="0"/>
-              <a:t>2023-10-26</a:t>
+              <a:t>2023-10-30</a:t>
             </a:fld>
             <a:endParaRPr lang="en-CA"/>
           </a:p>
@@ -1410,7 +1417,7 @@
           <a:p>
             <a:fld id="{D9479DD7-8618-4892-AD77-F3908D95C210}" type="datetimeFigureOut">
               <a:rPr lang="en-CA" smtClean="0"/>
-              <a:t>2023-10-26</a:t>
+              <a:t>2023-10-30</a:t>
             </a:fld>
             <a:endParaRPr lang="en-CA"/>
           </a:p>
@@ -1825,7 +1832,7 @@
           <a:p>
             <a:fld id="{D9479DD7-8618-4892-AD77-F3908D95C210}" type="datetimeFigureOut">
               <a:rPr lang="en-CA" smtClean="0"/>
-              <a:t>2023-10-26</a:t>
+              <a:t>2023-10-30</a:t>
             </a:fld>
             <a:endParaRPr lang="en-CA"/>
           </a:p>
@@ -1967,7 +1974,7 @@
           <a:p>
             <a:fld id="{D9479DD7-8618-4892-AD77-F3908D95C210}" type="datetimeFigureOut">
               <a:rPr lang="en-CA" smtClean="0"/>
-              <a:t>2023-10-26</a:t>
+              <a:t>2023-10-30</a:t>
             </a:fld>
             <a:endParaRPr lang="en-CA"/>
           </a:p>
@@ -2080,7 +2087,7 @@
           <a:p>
             <a:fld id="{D9479DD7-8618-4892-AD77-F3908D95C210}" type="datetimeFigureOut">
               <a:rPr lang="en-CA" smtClean="0"/>
-              <a:t>2023-10-26</a:t>
+              <a:t>2023-10-30</a:t>
             </a:fld>
             <a:endParaRPr lang="en-CA"/>
           </a:p>
@@ -2393,7 +2400,7 @@
           <a:p>
             <a:fld id="{D9479DD7-8618-4892-AD77-F3908D95C210}" type="datetimeFigureOut">
               <a:rPr lang="en-CA" smtClean="0"/>
-              <a:t>2023-10-26</a:t>
+              <a:t>2023-10-30</a:t>
             </a:fld>
             <a:endParaRPr lang="en-CA"/>
           </a:p>
@@ -2682,7 +2689,7 @@
           <a:p>
             <a:fld id="{D9479DD7-8618-4892-AD77-F3908D95C210}" type="datetimeFigureOut">
               <a:rPr lang="en-CA" smtClean="0"/>
-              <a:t>2023-10-26</a:t>
+              <a:t>2023-10-30</a:t>
             </a:fld>
             <a:endParaRPr lang="en-CA"/>
           </a:p>
@@ -2925,7 +2932,7 @@
           <a:p>
             <a:fld id="{D9479DD7-8618-4892-AD77-F3908D95C210}" type="datetimeFigureOut">
               <a:rPr lang="en-CA" smtClean="0"/>
-              <a:t>2023-10-26</a:t>
+              <a:t>2023-10-30</a:t>
             </a:fld>
             <a:endParaRPr lang="en-CA"/>
           </a:p>
@@ -3433,6 +3440,257 @@
 </p:sld>
 </file>
 
+<file path=ppt/slides/slide2.xml><?xml version="1.0" encoding="utf-8"?>
+<p:sld xmlns:a="http://schemas.openxmlformats.org/drawingml/2006/main" xmlns:r="http://schemas.openxmlformats.org/officeDocument/2006/relationships" xmlns:p="http://schemas.openxmlformats.org/presentationml/2006/main">
+  <p:cSld>
+    <p:spTree>
+      <p:nvGrpSpPr>
+        <p:cNvPr id="1" name=""/>
+        <p:cNvGrpSpPr/>
+        <p:nvPr/>
+      </p:nvGrpSpPr>
+      <p:grpSpPr>
+        <a:xfrm>
+          <a:off x="0" y="0"/>
+          <a:ext cx="0" cy="0"/>
+          <a:chOff x="0" y="0"/>
+          <a:chExt cx="0" cy="0"/>
+        </a:xfrm>
+      </p:grpSpPr>
+      <p:pic>
+        <p:nvPicPr>
+          <p:cNvPr id="5" name="Picture 4">
+            <a:extLst>
+              <a:ext uri="{FF2B5EF4-FFF2-40B4-BE49-F238E27FC236}">
+                <a16:creationId xmlns:a16="http://schemas.microsoft.com/office/drawing/2014/main" id="{9E1C71F5-A002-8F44-051B-58F9065887C4}"/>
+              </a:ext>
+            </a:extLst>
+          </p:cNvPr>
+          <p:cNvPicPr>
+            <a:picLocks noChangeAspect="1"/>
+          </p:cNvPicPr>
+          <p:nvPr/>
+        </p:nvPicPr>
+        <p:blipFill>
+          <a:blip r:embed="rId2">
+            <a:extLst>
+              <a:ext uri="{28A0092B-C50C-407E-A947-70E740481C1C}">
+                <a14:useLocalDpi xmlns:a14="http://schemas.microsoft.com/office/drawing/2010/main" val="0"/>
+              </a:ext>
+            </a:extLst>
+          </a:blip>
+          <a:stretch>
+            <a:fillRect/>
+          </a:stretch>
+        </p:blipFill>
+        <p:spPr>
+          <a:xfrm>
+            <a:off x="2921397" y="3149635"/>
+            <a:ext cx="2275754" cy="797214"/>
+          </a:xfrm>
+          <a:prstGeom prst="rect">
+            <a:avLst/>
+          </a:prstGeom>
+          <a:solidFill>
+            <a:srgbClr val="00A2FF"/>
+          </a:solidFill>
+        </p:spPr>
+      </p:pic>
+      <p:sp>
+        <p:nvSpPr>
+          <p:cNvPr id="6" name="TextBox 5">
+            <a:extLst>
+              <a:ext uri="{FF2B5EF4-FFF2-40B4-BE49-F238E27FC236}">
+                <a16:creationId xmlns:a16="http://schemas.microsoft.com/office/drawing/2014/main" id="{A3D0CFA2-F643-573E-FE1C-17FB28565B59}"/>
+              </a:ext>
+            </a:extLst>
+          </p:cNvPr>
+          <p:cNvSpPr txBox="1"/>
+          <p:nvPr/>
+        </p:nvSpPr>
+        <p:spPr>
+          <a:xfrm>
+            <a:off x="2921397" y="3355255"/>
+            <a:ext cx="2275754" cy="369332"/>
+          </a:xfrm>
+          <a:prstGeom prst="rect">
+            <a:avLst/>
+          </a:prstGeom>
+          <a:noFill/>
+        </p:spPr>
+        <p:txBody>
+          <a:bodyPr wrap="square" rtlCol="0">
+            <a:spAutoFit/>
+          </a:bodyPr>
+          <a:lstStyle/>
+          <a:p>
+            <a:pPr algn="ctr"/>
+            <a:r>
+              <a:rPr lang="en-CA" b="1" dirty="0">
+                <a:solidFill>
+                  <a:schemeClr val="bg1"/>
+                </a:solidFill>
+                <a:latin typeface="Arial" panose="020B0604020202020204" pitchFamily="34" charset="0"/>
+                <a:cs typeface="Arial" panose="020B0604020202020204" pitchFamily="34" charset="0"/>
+              </a:rPr>
+              <a:t>Launch Periodic</a:t>
+            </a:r>
+          </a:p>
+        </p:txBody>
+      </p:sp>
+      <p:sp>
+        <p:nvSpPr>
+          <p:cNvPr id="2" name="Rectangle: Rounded Corners 1">
+            <a:extLst>
+              <a:ext uri="{FF2B5EF4-FFF2-40B4-BE49-F238E27FC236}">
+                <a16:creationId xmlns:a16="http://schemas.microsoft.com/office/drawing/2014/main" id="{4E13740A-72FA-5A8B-03A9-2984F993A5BF}"/>
+              </a:ext>
+            </a:extLst>
+          </p:cNvPr>
+          <p:cNvSpPr/>
+          <p:nvPr/>
+        </p:nvSpPr>
+        <p:spPr>
+          <a:xfrm>
+            <a:off x="5638799" y="3149635"/>
+            <a:ext cx="2600131" cy="914400"/>
+          </a:xfrm>
+          <a:prstGeom prst="roundRect">
+            <a:avLst/>
+          </a:prstGeom>
+          <a:solidFill>
+            <a:srgbClr val="00A2FF"/>
+          </a:solidFill>
+          <a:ln>
+            <a:solidFill>
+              <a:srgbClr val="00A2FF"/>
+            </a:solidFill>
+          </a:ln>
+        </p:spPr>
+        <p:style>
+          <a:lnRef idx="2">
+            <a:schemeClr val="accent1">
+              <a:shade val="15000"/>
+            </a:schemeClr>
+          </a:lnRef>
+          <a:fillRef idx="1">
+            <a:schemeClr val="accent1"/>
+          </a:fillRef>
+          <a:effectRef idx="0">
+            <a:schemeClr val="accent1"/>
+          </a:effectRef>
+          <a:fontRef idx="minor">
+            <a:schemeClr val="lt1"/>
+          </a:fontRef>
+        </p:style>
+        <p:txBody>
+          <a:bodyPr rtlCol="0" anchor="ctr"/>
+          <a:lstStyle/>
+          <a:p>
+            <a:pPr algn="ctr"/>
+            <a:r>
+              <a:rPr lang="en-CA" sz="2000" b="1" dirty="0">
+                <a:latin typeface="Arial" panose="020B0604020202020204" pitchFamily="34" charset="0"/>
+                <a:cs typeface="Arial" panose="020B0604020202020204" pitchFamily="34" charset="0"/>
+              </a:rPr>
+              <a:t>Launch Periodic</a:t>
+            </a:r>
+          </a:p>
+        </p:txBody>
+      </p:sp>
+    </p:spTree>
+    <p:extLst>
+      <p:ext uri="{BB962C8B-B14F-4D97-AF65-F5344CB8AC3E}">
+        <p14:creationId xmlns:p14="http://schemas.microsoft.com/office/powerpoint/2010/main" val="259988870"/>
+      </p:ext>
+    </p:extLst>
+  </p:cSld>
+  <p:clrMapOvr>
+    <a:masterClrMapping/>
+  </p:clrMapOvr>
+</p:sld>
+</file>
+
+<file path=ppt/slides/slide3.xml><?xml version="1.0" encoding="utf-8"?>
+<p:sld xmlns:a="http://schemas.openxmlformats.org/drawingml/2006/main" xmlns:r="http://schemas.openxmlformats.org/officeDocument/2006/relationships" xmlns:p="http://schemas.openxmlformats.org/presentationml/2006/main">
+  <p:cSld>
+    <p:spTree>
+      <p:nvGrpSpPr>
+        <p:cNvPr id="1" name=""/>
+        <p:cNvGrpSpPr/>
+        <p:nvPr/>
+      </p:nvGrpSpPr>
+      <p:grpSpPr>
+        <a:xfrm>
+          <a:off x="0" y="0"/>
+          <a:ext cx="0" cy="0"/>
+          <a:chOff x="0" y="0"/>
+          <a:chExt cx="0" cy="0"/>
+        </a:xfrm>
+      </p:grpSpPr>
+      <p:sp>
+        <p:nvSpPr>
+          <p:cNvPr id="2" name="Title 1">
+            <a:extLst>
+              <a:ext uri="{FF2B5EF4-FFF2-40B4-BE49-F238E27FC236}">
+                <a16:creationId xmlns:a16="http://schemas.microsoft.com/office/drawing/2014/main" id="{FA2E86D6-7197-1321-9309-0572DD10B5BA}"/>
+              </a:ext>
+            </a:extLst>
+          </p:cNvPr>
+          <p:cNvSpPr>
+            <a:spLocks noGrp="1"/>
+          </p:cNvSpPr>
+          <p:nvPr>
+            <p:ph type="title"/>
+          </p:nvPr>
+        </p:nvSpPr>
+        <p:spPr/>
+        <p:txBody>
+          <a:bodyPr/>
+          <a:lstStyle/>
+          <a:p>
+            <a:endParaRPr lang="en-CA"/>
+          </a:p>
+        </p:txBody>
+      </p:sp>
+      <p:sp>
+        <p:nvSpPr>
+          <p:cNvPr id="3" name="Content Placeholder 2">
+            <a:extLst>
+              <a:ext uri="{FF2B5EF4-FFF2-40B4-BE49-F238E27FC236}">
+                <a16:creationId xmlns:a16="http://schemas.microsoft.com/office/drawing/2014/main" id="{48727E81-BFBB-6718-E021-1D11C1649DCF}"/>
+              </a:ext>
+            </a:extLst>
+          </p:cNvPr>
+          <p:cNvSpPr>
+            <a:spLocks noGrp="1"/>
+          </p:cNvSpPr>
+          <p:nvPr>
+            <p:ph idx="1"/>
+          </p:nvPr>
+        </p:nvSpPr>
+        <p:spPr/>
+        <p:txBody>
+          <a:bodyPr/>
+          <a:lstStyle/>
+          <a:p>
+            <a:endParaRPr lang="en-CA"/>
+          </a:p>
+        </p:txBody>
+      </p:sp>
+    </p:spTree>
+    <p:extLst>
+      <p:ext uri="{BB962C8B-B14F-4D97-AF65-F5344CB8AC3E}">
+        <p14:creationId xmlns:p14="http://schemas.microsoft.com/office/powerpoint/2010/main" val="3382193749"/>
+      </p:ext>
+    </p:extLst>
+  </p:cSld>
+  <p:clrMapOvr>
+    <a:masterClrMapping/>
+  </p:clrMapOvr>
+</p:sld>
+</file>
+
 <file path=ppt/theme/theme1.xml><?xml version="1.0" encoding="utf-8"?>
 <a:theme xmlns:a="http://schemas.openxmlformats.org/drawingml/2006/main" name="Office Theme">
   <a:themeElements>

</xml_diff>